<commit_message>
Feat : quiz 추가
</commit_message>
<xml_diff>
--- a/20220628/python_자료구조.pptx
+++ b/20220628/python_자료구조.pptx
@@ -6583,9 +6583,8 @@
             </a:r>
           </a:p>
           <a:p>
-            <a:pPr marL="971550" lvl="1" indent="-514350">
-              <a:buFont typeface="+mj-lt"/>
-              <a:buAutoNum type="arabicPeriod"/>
+            <a:pPr marL="457200" lvl="1" indent="0">
+              <a:buNone/>
             </a:pPr>
             <a:endParaRPr kumimoji="1" lang="en-US" altLang="ko-KR" dirty="0"/>
           </a:p>
@@ -7423,47 +7422,6 @@
             <a:r>
               <a:rPr kumimoji="1" lang="en-US" altLang="ko-KR" dirty="0"/>
               <a:t>][j][k]…</a:t>
-            </a:r>
-          </a:p>
-          <a:p>
-            <a:pPr marL="914400" lvl="2" indent="0">
-              <a:buNone/>
-            </a:pPr>
-            <a:r>
-              <a:rPr kumimoji="1" lang="en-US" altLang="ko-KR" dirty="0"/>
-              <a:t>Quiz!  a = [1, 2, [3, 4, [“hello”, “</a:t>
-            </a:r>
-            <a:r>
-              <a:rPr kumimoji="1" lang="en-US" altLang="ko-KR" dirty="0" err="1"/>
-              <a:t>yusom</a:t>
-            </a:r>
-            <a:r>
-              <a:rPr kumimoji="1" lang="en-US" altLang="ko-KR" dirty="0"/>
-              <a:t>”]]]</a:t>
-            </a:r>
-            <a:r>
-              <a:rPr kumimoji="1" lang="ko-KR" altLang="en-US" dirty="0"/>
-              <a:t> </a:t>
-            </a:r>
-            <a:r>
-              <a:rPr kumimoji="1" lang="en-US" altLang="ko-KR" dirty="0"/>
-              <a:t>“</a:t>
-            </a:r>
-            <a:r>
-              <a:rPr kumimoji="1" lang="en-US" altLang="ko-KR" dirty="0" err="1"/>
-              <a:t>yusom</a:t>
-            </a:r>
-            <a:r>
-              <a:rPr kumimoji="1" lang="en-US" altLang="ko-KR" dirty="0"/>
-              <a:t>”</a:t>
-            </a:r>
-            <a:r>
-              <a:rPr kumimoji="1" lang="ko-KR" altLang="en-US" dirty="0"/>
-              <a:t>문자열을 가져 오는 방법은</a:t>
-            </a:r>
-            <a:r>
-              <a:rPr kumimoji="1" lang="en-US" altLang="ko-KR" dirty="0"/>
-              <a:t>? </a:t>
             </a:r>
           </a:p>
         </p:txBody>
@@ -10248,42 +10206,6 @@
           </a:graphicData>
         </a:graphic>
       </p:graphicFrame>
-      <p:sp>
-        <p:nvSpPr>
-          <p:cNvPr id="6" name="TextBox 5">
-            <a:extLst>
-              <a:ext uri="{FF2B5EF4-FFF2-40B4-BE49-F238E27FC236}">
-                <a16:creationId xmlns:a16="http://schemas.microsoft.com/office/drawing/2014/main" id="{A15874CD-F418-51D7-5B0C-6A73DDE4C4A5}"/>
-              </a:ext>
-            </a:extLst>
-          </p:cNvPr>
-          <p:cNvSpPr txBox="1"/>
-          <p:nvPr/>
-        </p:nvSpPr>
-        <p:spPr>
-          <a:xfrm>
-            <a:off x="7353209" y="5232064"/>
-            <a:ext cx="3009647" cy="369332"/>
-          </a:xfrm>
-          <a:prstGeom prst="rect">
-            <a:avLst/>
-          </a:prstGeom>
-          <a:noFill/>
-        </p:spPr>
-        <p:txBody>
-          <a:bodyPr wrap="square" rtlCol="0">
-            <a:spAutoFit/>
-          </a:bodyPr>
-          <a:lstStyle/>
-          <a:p>
-            <a:r>
-              <a:rPr kumimoji="1" lang="en-US" altLang="ko-Kore-KR" dirty="0"/>
-              <a:t>Quiz! a[-7 : -10] -&gt; ? </a:t>
-            </a:r>
-            <a:endParaRPr kumimoji="1" lang="ko-Kore-KR" altLang="en-US" dirty="0"/>
-          </a:p>
-        </p:txBody>
-      </p:sp>
       <p:pic>
         <p:nvPicPr>
           <p:cNvPr id="8" name="그림 7">

</xml_diff>